<commit_message>
worked on PA3, worked a little on HA2 and updated the powerpoint for the cultural assignment
</commit_message>
<xml_diff>
--- a/Cultural Assignment/Cultural Assignment Presentation.pptx
+++ b/Cultural Assignment/Cultural Assignment Presentation.pptx
@@ -11,8 +11,10 @@
     <p:sldId id="259" r:id="rId5"/>
     <p:sldId id="260" r:id="rId6"/>
     <p:sldId id="261" r:id="rId7"/>
-    <p:sldId id="262" r:id="rId8"/>
-    <p:sldId id="263" r:id="rId9"/>
+    <p:sldId id="264" r:id="rId8"/>
+    <p:sldId id="262" r:id="rId9"/>
+    <p:sldId id="263" r:id="rId10"/>
+    <p:sldId id="265" r:id="rId11"/>
   </p:sldIdLst>
   <p:sldSz cx="12192000" cy="6858000"/>
   <p:notesSz cx="6858000" cy="9144000"/>
@@ -615,7 +617,7 @@
           <a:p>
             <a:fld id="{B18F98B3-83FE-5043-B9A5-7A92B3418AA7}" type="datetimeFigureOut">
               <a:rPr lang="en-US" smtClean="0"/>
-              <a:t>7/8/17</a:t>
+              <a:t>7/24/17</a:t>
             </a:fld>
             <a:endParaRPr lang="en-US"/>
           </a:p>
@@ -790,7 +792,7 @@
           <a:p>
             <a:fld id="{B18F98B3-83FE-5043-B9A5-7A92B3418AA7}" type="datetimeFigureOut">
               <a:rPr lang="en-US" smtClean="0"/>
-              <a:t>7/8/17</a:t>
+              <a:t>7/24/17</a:t>
             </a:fld>
             <a:endParaRPr lang="en-US"/>
           </a:p>
@@ -966,7 +968,7 @@
           <a:p>
             <a:fld id="{B18F98B3-83FE-5043-B9A5-7A92B3418AA7}" type="datetimeFigureOut">
               <a:rPr lang="en-US" smtClean="0"/>
-              <a:t>7/8/17</a:t>
+              <a:t>7/24/17</a:t>
             </a:fld>
             <a:endParaRPr lang="en-US"/>
           </a:p>
@@ -1132,7 +1134,7 @@
           <a:p>
             <a:fld id="{B18F98B3-83FE-5043-B9A5-7A92B3418AA7}" type="datetimeFigureOut">
               <a:rPr lang="en-US" smtClean="0"/>
-              <a:t>7/8/17</a:t>
+              <a:t>7/24/17</a:t>
             </a:fld>
             <a:endParaRPr lang="en-US"/>
           </a:p>
@@ -1449,7 +1451,7 @@
           <a:p>
             <a:fld id="{B18F98B3-83FE-5043-B9A5-7A92B3418AA7}" type="datetimeFigureOut">
               <a:rPr lang="en-US" smtClean="0"/>
-              <a:t>7/8/17</a:t>
+              <a:t>7/24/17</a:t>
             </a:fld>
             <a:endParaRPr lang="en-US"/>
           </a:p>
@@ -1905,7 +1907,7 @@
           <a:p>
             <a:fld id="{B18F98B3-83FE-5043-B9A5-7A92B3418AA7}" type="datetimeFigureOut">
               <a:rPr lang="en-US" smtClean="0"/>
-              <a:t>7/8/17</a:t>
+              <a:t>7/24/17</a:t>
             </a:fld>
             <a:endParaRPr lang="en-US"/>
           </a:p>
@@ -2312,7 +2314,7 @@
           <a:p>
             <a:fld id="{B18F98B3-83FE-5043-B9A5-7A92B3418AA7}" type="datetimeFigureOut">
               <a:rPr lang="en-US" smtClean="0"/>
-              <a:t>7/8/17</a:t>
+              <a:t>7/24/17</a:t>
             </a:fld>
             <a:endParaRPr lang="en-US"/>
           </a:p>
@@ -2426,7 +2428,7 @@
           <a:p>
             <a:fld id="{B18F98B3-83FE-5043-B9A5-7A92B3418AA7}" type="datetimeFigureOut">
               <a:rPr lang="en-US" smtClean="0"/>
-              <a:t>7/8/17</a:t>
+              <a:t>7/24/17</a:t>
             </a:fld>
             <a:endParaRPr lang="en-US"/>
           </a:p>
@@ -2540,7 +2542,7 @@
           <a:p>
             <a:fld id="{B18F98B3-83FE-5043-B9A5-7A92B3418AA7}" type="datetimeFigureOut">
               <a:rPr lang="en-US" smtClean="0"/>
-              <a:t>7/8/17</a:t>
+              <a:t>7/24/17</a:t>
             </a:fld>
             <a:endParaRPr lang="en-US"/>
           </a:p>
@@ -2894,7 +2896,7 @@
           <a:p>
             <a:fld id="{B18F98B3-83FE-5043-B9A5-7A92B3418AA7}" type="datetimeFigureOut">
               <a:rPr lang="en-US" smtClean="0"/>
-              <a:t>7/8/17</a:t>
+              <a:t>7/24/17</a:t>
             </a:fld>
             <a:endParaRPr lang="en-US"/>
           </a:p>
@@ -3397,7 +3399,7 @@
           <a:p>
             <a:fld id="{B18F98B3-83FE-5043-B9A5-7A92B3418AA7}" type="datetimeFigureOut">
               <a:rPr lang="en-US" smtClean="0"/>
-              <a:t>7/8/17</a:t>
+              <a:t>7/24/17</a:t>
             </a:fld>
             <a:endParaRPr lang="en-US"/>
           </a:p>
@@ -3748,7 +3750,7 @@
           <a:p>
             <a:fld id="{B18F98B3-83FE-5043-B9A5-7A92B3418AA7}" type="datetimeFigureOut">
               <a:rPr lang="en-US" smtClean="0"/>
-              <a:t>7/8/17</a:t>
+              <a:t>7/24/17</a:t>
             </a:fld>
             <a:endParaRPr lang="en-US"/>
           </a:p>
@@ -4411,23 +4413,23 @@
         <p:spPr/>
         <p:txBody>
           <a:bodyPr>
-            <a:normAutofit fontScale="90000"/>
+            <a:noAutofit/>
           </a:bodyPr>
           <a:lstStyle/>
           <a:p>
             <a:r>
-              <a:rPr lang="en-US" dirty="0" smtClean="0"/>
+              <a:rPr lang="en-US" sz="6000" dirty="0" smtClean="0"/>
               <a:t>The </a:t>
             </a:r>
             <a:r>
-              <a:rPr lang="en-US" dirty="0" err="1" smtClean="0"/>
+              <a:rPr lang="en-US" sz="6000" dirty="0" err="1" smtClean="0"/>
               <a:t>Lesk</a:t>
             </a:r>
             <a:r>
-              <a:rPr lang="en-US" dirty="0" smtClean="0"/>
+              <a:rPr lang="en-US" sz="6000" dirty="0" smtClean="0"/>
               <a:t> Algorithm and its Use in Word Sense Disambiguation</a:t>
             </a:r>
-            <a:endParaRPr lang="en-US" dirty="0"/>
+            <a:endParaRPr lang="en-US" sz="6000" dirty="0"/>
           </a:p>
         </p:txBody>
       </p:sp>
@@ -4472,6 +4474,149 @@
     <p:extLst>
       <p:ext uri="{BB962C8B-B14F-4D97-AF65-F5344CB8AC3E}">
         <p14:creationId xmlns:p14="http://schemas.microsoft.com/office/powerpoint/2010/main" val="1915740912"/>
+      </p:ext>
+    </p:extLst>
+  </p:cSld>
+  <p:clrMapOvr>
+    <a:masterClrMapping/>
+  </p:clrMapOvr>
+</p:sld>
+</file>
+
+<file path=ppt/slides/slide10.xml><?xml version="1.0" encoding="utf-8"?>
+<p:sld xmlns:a="http://schemas.openxmlformats.org/drawingml/2006/main" xmlns:r="http://schemas.openxmlformats.org/officeDocument/2006/relationships" xmlns:p="http://schemas.openxmlformats.org/presentationml/2006/main">
+  <p:cSld>
+    <p:spTree>
+      <p:nvGrpSpPr>
+        <p:cNvPr id="1" name=""/>
+        <p:cNvGrpSpPr/>
+        <p:nvPr/>
+      </p:nvGrpSpPr>
+      <p:grpSpPr>
+        <a:xfrm>
+          <a:off x="0" y="0"/>
+          <a:ext cx="0" cy="0"/>
+          <a:chOff x="0" y="0"/>
+          <a:chExt cx="0" cy="0"/>
+        </a:xfrm>
+      </p:grpSpPr>
+      <p:sp>
+        <p:nvSpPr>
+          <p:cNvPr id="2" name="Title 1"/>
+          <p:cNvSpPr>
+            <a:spLocks noGrp="1"/>
+          </p:cNvSpPr>
+          <p:nvPr>
+            <p:ph type="title"/>
+          </p:nvPr>
+        </p:nvSpPr>
+        <p:spPr/>
+        <p:txBody>
+          <a:bodyPr/>
+          <a:lstStyle/>
+          <a:p>
+            <a:r>
+              <a:rPr lang="en-US" dirty="0" smtClean="0"/>
+              <a:t>Citation</a:t>
+            </a:r>
+            <a:endParaRPr lang="en-US" dirty="0"/>
+          </a:p>
+        </p:txBody>
+      </p:sp>
+      <p:sp>
+        <p:nvSpPr>
+          <p:cNvPr id="3" name="Content Placeholder 2"/>
+          <p:cNvSpPr>
+            <a:spLocks noGrp="1"/>
+          </p:cNvSpPr>
+          <p:nvPr>
+            <p:ph idx="1"/>
+          </p:nvPr>
+        </p:nvSpPr>
+        <p:spPr/>
+        <p:txBody>
+          <a:bodyPr/>
+          <a:lstStyle/>
+          <a:p>
+            <a:r>
+              <a:rPr lang="en-US" dirty="0" err="1"/>
+              <a:t>Srinivas</a:t>
+            </a:r>
+            <a:r>
+              <a:rPr lang="en-US" dirty="0"/>
+              <a:t>, </a:t>
+            </a:r>
+            <a:r>
+              <a:rPr lang="en-US" dirty="0" err="1"/>
+              <a:t>Mulkalapalli</a:t>
+            </a:r>
+            <a:r>
+              <a:rPr lang="en-US" dirty="0"/>
+              <a:t>, and B. </a:t>
+            </a:r>
+            <a:r>
+              <a:rPr lang="en-US" dirty="0" err="1"/>
+              <a:t>Padmaja</a:t>
+            </a:r>
+            <a:r>
+              <a:rPr lang="en-US" dirty="0"/>
+              <a:t> Ran. "Word Sense Disambiguation </a:t>
+            </a:r>
+            <a:r>
+              <a:rPr lang="en-US" dirty="0" smtClean="0"/>
+              <a:t>Techniques for Indian and Other Asian Languages: A Survey." </a:t>
+            </a:r>
+            <a:r>
+              <a:rPr lang="en-US" i="1" dirty="0" smtClean="0"/>
+              <a:t>International Journal of Computer Applications</a:t>
+            </a:r>
+            <a:r>
+              <a:rPr lang="en-US" dirty="0" smtClean="0"/>
+              <a:t> 156.8 (2016): 35-41. </a:t>
+            </a:r>
+            <a:r>
+              <a:rPr lang="en-US" i="1" dirty="0" err="1" smtClean="0"/>
+              <a:t>ProQuest</a:t>
+            </a:r>
+            <a:r>
+              <a:rPr lang="en-US" dirty="0" smtClean="0"/>
+              <a:t>. Dec. 2016. Web. 7 July 2017. &lt;http://</a:t>
+            </a:r>
+            <a:r>
+              <a:rPr lang="en-US" dirty="0" err="1" smtClean="0"/>
+              <a:t>search.proquest.com</a:t>
+            </a:r>
+            <a:r>
+              <a:rPr lang="en-US" dirty="0" smtClean="0"/>
+              <a:t>/</a:t>
+            </a:r>
+            <a:r>
+              <a:rPr lang="en-US" dirty="0" err="1" smtClean="0"/>
+              <a:t>docview</a:t>
+            </a:r>
+            <a:r>
+              <a:rPr lang="en-US" dirty="0" smtClean="0"/>
+              <a:t>/1913919486?pq-origsite=</a:t>
+            </a:r>
+            <a:r>
+              <a:rPr lang="en-US" dirty="0" err="1" smtClean="0"/>
+              <a:t>gscholar</a:t>
+            </a:r>
+            <a:r>
+              <a:rPr lang="en-US" dirty="0" smtClean="0"/>
+              <a:t>&gt;.</a:t>
+            </a:r>
+            <a:endParaRPr lang="en-US" dirty="0"/>
+          </a:p>
+          <a:p>
+            <a:endParaRPr lang="en-US" dirty="0"/>
+          </a:p>
+        </p:txBody>
+      </p:sp>
+    </p:spTree>
+    <p:extLst>
+      <p:ext uri="{BB962C8B-B14F-4D97-AF65-F5344CB8AC3E}">
+        <p14:creationId xmlns:p14="http://schemas.microsoft.com/office/powerpoint/2010/main" val="1440148181"/>
       </p:ext>
     </p:extLst>
   </p:cSld>
@@ -4551,7 +4696,7 @@
             <a:pPr lvl="1"/>
             <a:r>
               <a:rPr lang="en-US" dirty="0" smtClean="0"/>
-              <a:t>Ex “The trophy will not fit in my suitcase, it is too small”</a:t>
+              <a:t>Ex. -  “The trophy will not fit in my suitcase, it is too small”</a:t>
             </a:r>
           </a:p>
           <a:p>
@@ -4625,7 +4770,7 @@
           </a:prstGeom>
           <a:noFill/>
           <a:extLst>
-            <a:ext uri="{909E8E84-426E-40DD-AFC4-6F175D3DCCD1}">
+            <a:ext uri="{909E8E84-426E-40dd-AFC4-6F175D3DCCD1}">
               <a14:hiddenFill xmlns:a14="http://schemas.microsoft.com/office/drawing/2010/main">
                 <a:solidFill>
                   <a:srgbClr val="FFFFFF"/>
@@ -5283,7 +5428,6 @@
               <a:rPr lang="en-US" sz="2400" dirty="0" smtClean="0"/>
               <a:t>inds the correct meaning of each word in context by individually locating the sense that overlaps the most between its dictionary definition and the given context</a:t>
             </a:r>
-            <a:endParaRPr lang="en-US" sz="2400" dirty="0" smtClean="0"/>
           </a:p>
           <a:p>
             <a:r>
@@ -5305,13 +5449,8 @@
           <a:p>
             <a:r>
               <a:rPr lang="en-US" sz="2400" dirty="0" smtClean="0"/>
-              <a:t>Other methods </a:t>
-            </a:r>
-            <a:r>
-              <a:rPr lang="en-US" sz="2400" dirty="0" smtClean="0"/>
-              <a:t>simultaneously determining the meanings of all words in a given sentence or string</a:t>
-            </a:r>
-            <a:endParaRPr lang="en-US" sz="2400" dirty="0" smtClean="0"/>
+              <a:t>Other methods simultaneously determining the meanings of all words in a given sentence or string</a:t>
+            </a:r>
           </a:p>
           <a:p>
             <a:endParaRPr lang="en-US" dirty="0"/>
@@ -5382,108 +5521,55 @@
           <a:lstStyle/>
           <a:p>
             <a:r>
-              <a:rPr lang="en-US" dirty="0" smtClean="0"/>
-              <a:t>Disadvantages of the </a:t>
-            </a:r>
-            <a:r>
               <a:rPr lang="en-US" dirty="0" err="1" smtClean="0"/>
               <a:t>Lesk</a:t>
             </a:r>
             <a:r>
               <a:rPr lang="en-US" dirty="0" smtClean="0"/>
-              <a:t> Algorithm</a:t>
+              <a:t> </a:t>
+            </a:r>
+            <a:r>
+              <a:rPr lang="en-US" dirty="0" err="1" smtClean="0"/>
+              <a:t>PsuedoCode</a:t>
             </a:r>
             <a:endParaRPr lang="en-US" dirty="0"/>
           </a:p>
         </p:txBody>
       </p:sp>
-      <p:sp>
-        <p:nvSpPr>
-          <p:cNvPr id="3" name="Content Placeholder 2"/>
-          <p:cNvSpPr>
-            <a:spLocks noGrp="1"/>
-          </p:cNvSpPr>
-          <p:nvPr>
-            <p:ph idx="1"/>
-          </p:nvPr>
-        </p:nvSpPr>
-        <p:spPr/>
-        <p:txBody>
-          <a:bodyPr>
-            <a:normAutofit/>
-          </a:bodyPr>
-          <a:lstStyle/>
-          <a:p>
-            <a:r>
-              <a:rPr lang="en-US" sz="2400" dirty="0"/>
-              <a:t>V</a:t>
-            </a:r>
-            <a:r>
-              <a:rPr lang="en-US" sz="2400" dirty="0" smtClean="0"/>
-              <a:t>ery sensitive to the exact wording of the particular definition that is used</a:t>
-            </a:r>
-          </a:p>
-          <a:p>
-            <a:pPr lvl="1"/>
-            <a:r>
-              <a:rPr lang="en-US" sz="2000" dirty="0" smtClean="0"/>
-              <a:t>Accuracy can depend on the dictionary used</a:t>
-            </a:r>
-          </a:p>
-          <a:p>
-            <a:pPr lvl="1"/>
-            <a:r>
-              <a:rPr lang="en-US" sz="2000" dirty="0" smtClean="0"/>
-              <a:t>Will be different for differently worded definitions even if it means the same thing</a:t>
-            </a:r>
-          </a:p>
-          <a:p>
-            <a:r>
-              <a:rPr lang="en-US" sz="2400" dirty="0"/>
-              <a:t>O</a:t>
-            </a:r>
-            <a:r>
-              <a:rPr lang="en-US" sz="2400" dirty="0" smtClean="0"/>
-              <a:t>nly uses the glosses of senses of the word being considered</a:t>
-            </a:r>
-          </a:p>
-          <a:p>
-            <a:pPr lvl="1"/>
-            <a:r>
-              <a:rPr lang="en-US" sz="2000" dirty="0" smtClean="0"/>
-              <a:t>A gloss is a series of brief explanations, such as definitions or pronunciations</a:t>
-            </a:r>
-            <a:endParaRPr lang="en-US" sz="2000" dirty="0"/>
-          </a:p>
-          <a:p>
-            <a:pPr lvl="1"/>
-            <a:r>
-              <a:rPr lang="en-US" sz="2000" dirty="0" smtClean="0"/>
-              <a:t>This is a pitfall because the dictionary may not have a complete set of glosses or may not have an extensive enough set for the algorithm to use</a:t>
-            </a:r>
-            <a:endParaRPr lang="en-US" sz="2000" dirty="0" smtClean="0"/>
-          </a:p>
-          <a:p>
-            <a:endParaRPr lang="en-US" dirty="0"/>
-          </a:p>
-          <a:p>
-            <a:endParaRPr lang="en-US" dirty="0" smtClean="0"/>
-          </a:p>
-          <a:p>
-            <a:endParaRPr lang="en-US" dirty="0"/>
-          </a:p>
-          <a:p>
-            <a:endParaRPr lang="en-US" dirty="0" smtClean="0"/>
-          </a:p>
-          <a:p>
-            <a:endParaRPr lang="en-US" dirty="0"/>
-          </a:p>
-        </p:txBody>
-      </p:sp>
+      <p:pic>
+        <p:nvPicPr>
+          <p:cNvPr id="7" name="Picture 6" descr="Screen Shot 2017-07-24 at 10.08.36 AM.png"/>
+          <p:cNvPicPr>
+            <a:picLocks noChangeAspect="1"/>
+          </p:cNvPicPr>
+          <p:nvPr/>
+        </p:nvPicPr>
+        <p:blipFill>
+          <a:blip r:embed="rId2">
+            <a:extLst>
+              <a:ext uri="{28A0092B-C50C-407E-A947-70E740481C1C}">
+                <a14:useLocalDpi xmlns:a14="http://schemas.microsoft.com/office/drawing/2010/main" val="0"/>
+              </a:ext>
+            </a:extLst>
+          </a:blip>
+          <a:stretch>
+            <a:fillRect/>
+          </a:stretch>
+        </p:blipFill>
+        <p:spPr>
+          <a:xfrm>
+            <a:off x="1895122" y="1514436"/>
+            <a:ext cx="8344126" cy="5188229"/>
+          </a:xfrm>
+          <a:prstGeom prst="rect">
+            <a:avLst/>
+          </a:prstGeom>
+        </p:spPr>
+      </p:pic>
     </p:spTree>
     <p:extLst>
       <p:ext uri="{BB962C8B-B14F-4D97-AF65-F5344CB8AC3E}">
-        <p14:creationId xmlns:p14="http://schemas.microsoft.com/office/powerpoint/2010/main" val="659178127"/>
+        <p14:creationId xmlns:p14="http://schemas.microsoft.com/office/powerpoint/2010/main" val="547313995"/>
       </p:ext>
     </p:extLst>
   </p:cSld>
@@ -5527,7 +5613,7 @@
           <a:p>
             <a:r>
               <a:rPr lang="en-US" dirty="0" smtClean="0"/>
-              <a:t>Uses of the </a:t>
+              <a:t>Disadvantages of the </a:t>
             </a:r>
             <a:r>
               <a:rPr lang="en-US" dirty="0" err="1" smtClean="0"/>
@@ -5535,7 +5621,7 @@
             </a:r>
             <a:r>
               <a:rPr lang="en-US" dirty="0" smtClean="0"/>
-              <a:t> Algorithm and WSD</a:t>
+              <a:t> Algorithm</a:t>
             </a:r>
             <a:endParaRPr lang="en-US" dirty="0"/>
           </a:p>
@@ -5559,67 +5645,187 @@
           <a:lstStyle/>
           <a:p>
             <a:r>
-              <a:rPr lang="en-US" sz="2200" dirty="0" smtClean="0"/>
-              <a:t>Smart Assistants</a:t>
+              <a:rPr lang="en-US" sz="2400" dirty="0"/>
+              <a:t>V</a:t>
+            </a:r>
+            <a:r>
+              <a:rPr lang="en-US" sz="2400" dirty="0" smtClean="0"/>
+              <a:t>ery sensitive to the exact wording of the particular definition that is used</a:t>
             </a:r>
           </a:p>
           <a:p>
             <a:pPr lvl="1"/>
             <a:r>
               <a:rPr lang="en-US" sz="2000" dirty="0" smtClean="0"/>
-              <a:t>Siri</a:t>
+              <a:t>Accuracy can depend on the dictionary used</a:t>
             </a:r>
           </a:p>
           <a:p>
             <a:pPr lvl="1"/>
             <a:r>
               <a:rPr lang="en-US" sz="2000" dirty="0" smtClean="0"/>
-              <a:t>Alexa</a:t>
+              <a:t>Will be different for differently worded definitions even if it means the same thing</a:t>
+            </a:r>
+          </a:p>
+          <a:p>
+            <a:r>
+              <a:rPr lang="en-US" sz="2400" dirty="0"/>
+              <a:t>O</a:t>
+            </a:r>
+            <a:r>
+              <a:rPr lang="en-US" sz="2400" dirty="0" smtClean="0"/>
+              <a:t>nly uses the glosses of senses of the word being considered</a:t>
             </a:r>
           </a:p>
           <a:p>
             <a:pPr lvl="1"/>
             <a:r>
               <a:rPr lang="en-US" sz="2000" dirty="0" smtClean="0"/>
-              <a:t>Cortana</a:t>
-            </a:r>
-          </a:p>
-          <a:p>
-            <a:r>
-              <a:rPr lang="en-US" sz="2200" dirty="0" smtClean="0"/>
+              <a:t>A gloss is a series of brief explanations, such as definitions or pronunciations</a:t>
+            </a:r>
+            <a:endParaRPr lang="en-US" sz="2000" dirty="0"/>
+          </a:p>
+          <a:p>
+            <a:pPr lvl="1"/>
+            <a:r>
+              <a:rPr lang="en-US" sz="2000" dirty="0" smtClean="0"/>
+              <a:t>This is a pitfall because the dictionary may not have a complete set of glosses or may not have an extensive enough set for the algorithm to use</a:t>
+            </a:r>
+          </a:p>
+          <a:p>
+            <a:endParaRPr lang="en-US" dirty="0"/>
+          </a:p>
+          <a:p>
+            <a:endParaRPr lang="en-US" dirty="0" smtClean="0"/>
+          </a:p>
+          <a:p>
+            <a:endParaRPr lang="en-US" dirty="0"/>
+          </a:p>
+          <a:p>
+            <a:endParaRPr lang="en-US" dirty="0" smtClean="0"/>
+          </a:p>
+          <a:p>
+            <a:endParaRPr lang="en-US" dirty="0"/>
+          </a:p>
+        </p:txBody>
+      </p:sp>
+    </p:spTree>
+    <p:extLst>
+      <p:ext uri="{BB962C8B-B14F-4D97-AF65-F5344CB8AC3E}">
+        <p14:creationId xmlns:p14="http://schemas.microsoft.com/office/powerpoint/2010/main" val="659178127"/>
+      </p:ext>
+    </p:extLst>
+  </p:cSld>
+  <p:clrMapOvr>
+    <a:masterClrMapping/>
+  </p:clrMapOvr>
+</p:sld>
+</file>
+
+<file path=ppt/slides/slide9.xml><?xml version="1.0" encoding="utf-8"?>
+<p:sld xmlns:a="http://schemas.openxmlformats.org/drawingml/2006/main" xmlns:r="http://schemas.openxmlformats.org/officeDocument/2006/relationships" xmlns:p="http://schemas.openxmlformats.org/presentationml/2006/main">
+  <p:cSld>
+    <p:spTree>
+      <p:nvGrpSpPr>
+        <p:cNvPr id="1" name=""/>
+        <p:cNvGrpSpPr/>
+        <p:nvPr/>
+      </p:nvGrpSpPr>
+      <p:grpSpPr>
+        <a:xfrm>
+          <a:off x="0" y="0"/>
+          <a:ext cx="0" cy="0"/>
+          <a:chOff x="0" y="0"/>
+          <a:chExt cx="0" cy="0"/>
+        </a:xfrm>
+      </p:grpSpPr>
+      <p:sp>
+        <p:nvSpPr>
+          <p:cNvPr id="2" name="Title 1"/>
+          <p:cNvSpPr>
+            <a:spLocks noGrp="1"/>
+          </p:cNvSpPr>
+          <p:nvPr>
+            <p:ph type="title"/>
+          </p:nvPr>
+        </p:nvSpPr>
+        <p:spPr/>
+        <p:txBody>
+          <a:bodyPr/>
+          <a:lstStyle/>
+          <a:p>
+            <a:r>
+              <a:rPr lang="en-US" dirty="0" smtClean="0"/>
+              <a:t>Uses of the </a:t>
+            </a:r>
+            <a:r>
+              <a:rPr lang="en-US" dirty="0" err="1" smtClean="0"/>
+              <a:t>Lesk</a:t>
+            </a:r>
+            <a:r>
+              <a:rPr lang="en-US" dirty="0" smtClean="0"/>
+              <a:t> Algorithm and WSD</a:t>
+            </a:r>
+            <a:endParaRPr lang="en-US" dirty="0"/>
+          </a:p>
+        </p:txBody>
+      </p:sp>
+      <p:sp>
+        <p:nvSpPr>
+          <p:cNvPr id="3" name="Content Placeholder 2"/>
+          <p:cNvSpPr>
+            <a:spLocks noGrp="1"/>
+          </p:cNvSpPr>
+          <p:nvPr>
+            <p:ph idx="1"/>
+          </p:nvPr>
+        </p:nvSpPr>
+        <p:spPr/>
+        <p:txBody>
+          <a:bodyPr>
+            <a:normAutofit/>
+          </a:bodyPr>
+          <a:lstStyle/>
+          <a:p>
+            <a:r>
+              <a:rPr lang="en-US" sz="2500" dirty="0" smtClean="0"/>
               <a:t>Search Engines</a:t>
             </a:r>
           </a:p>
           <a:p>
             <a:pPr lvl="1"/>
             <a:r>
-              <a:rPr lang="en-US" sz="2000" dirty="0" smtClean="0"/>
+              <a:rPr lang="en-US" sz="2500" dirty="0" smtClean="0"/>
               <a:t>Google </a:t>
             </a:r>
           </a:p>
           <a:p>
             <a:pPr lvl="1"/>
             <a:r>
-              <a:rPr lang="en-US" sz="2000" dirty="0" smtClean="0"/>
+              <a:rPr lang="en-US" sz="2500" dirty="0" smtClean="0"/>
               <a:t>Yahoo</a:t>
             </a:r>
-            <a:endParaRPr lang="en-US" sz="2000" dirty="0"/>
-          </a:p>
-          <a:p>
-            <a:r>
-              <a:rPr lang="en-US" sz="2200" dirty="0" smtClean="0"/>
+            <a:endParaRPr lang="en-US" sz="2500" dirty="0"/>
+          </a:p>
+          <a:p>
+            <a:r>
+              <a:rPr lang="en-US" sz="2500" dirty="0" smtClean="0"/>
               <a:t>Language Translation</a:t>
             </a:r>
           </a:p>
           <a:p>
             <a:pPr lvl="1"/>
             <a:r>
-              <a:rPr lang="en-US" sz="2000" dirty="0" smtClean="0"/>
+              <a:rPr lang="en-US" sz="2500" dirty="0" smtClean="0"/>
               <a:t>Needed to make accurate translations between languages</a:t>
             </a:r>
           </a:p>
           <a:p>
-            <a:endParaRPr lang="en-US" dirty="0"/>
+            <a:r>
+              <a:rPr lang="en-US" sz="2500" dirty="0" smtClean="0"/>
+              <a:t>Machine Learning and AI</a:t>
+            </a:r>
+            <a:endParaRPr lang="en-US" sz="2500" dirty="0"/>
           </a:p>
           <a:p>
             <a:endParaRPr lang="en-US" dirty="0" smtClean="0"/>
@@ -5697,7 +5903,7 @@
     </a:clrScheme>
     <a:fontScheme name="Wood Type">
       <a:majorFont>
-        <a:latin typeface="Rockwell Condensed" panose="02060603050405020104"/>
+        <a:latin typeface="Rockwell Condensed"/>
         <a:ea typeface=""/>
         <a:cs typeface=""/>
         <a:font script="Grek" typeface="Cambria"/>
@@ -5733,7 +5939,7 @@
         <a:font script="Uigh" typeface="Microsoft Uighur"/>
       </a:majorFont>
       <a:minorFont>
-        <a:latin typeface="Rockwell" panose="02060603020205020403"/>
+        <a:latin typeface="Rockwell"/>
         <a:ea typeface=""/>
         <a:cs typeface=""/>
         <a:font script="Grek" typeface="Cambria"/>
@@ -5877,7 +6083,7 @@
   <a:extraClrSchemeLst/>
   <a:extLst>
     <a:ext uri="{05A4C25C-085E-4340-85A3-A5531E510DB2}">
-      <thm15:themeFamily xmlns:thm15="http://schemas.microsoft.com/office/thememl/2012/main" name="Wood Type" id="{7ACABC62-BF99-48CF-A9DC-4DB89C7B13DC}" vid="{142A1326-48AB-42A9-8428-CB14AA30176D}"/>
+      <thm15:themeFamily xmlns="" xmlns:thm15="http://schemas.microsoft.com/office/thememl/2012/main" name="Wood Type" id="{7ACABC62-BF99-48CF-A9DC-4DB89C7B13DC}" vid="{142A1326-48AB-42A9-8428-CB14AA30176D}"/>
     </a:ext>
   </a:extLst>
 </a:theme>

</xml_diff>

<commit_message>
Worked on the homework 2. Modified the Cultural Assignment slides
</commit_message>
<xml_diff>
--- a/Cultural Assignment/Cultural Assignment Presentation.pptx
+++ b/Cultural Assignment/Cultural Assignment Presentation.pptx
@@ -617,7 +617,7 @@
           <a:p>
             <a:fld id="{B18F98B3-83FE-5043-B9A5-7A92B3418AA7}" type="datetimeFigureOut">
               <a:rPr lang="en-US" smtClean="0"/>
-              <a:t>7/24/17</a:t>
+              <a:t>7/25/17</a:t>
             </a:fld>
             <a:endParaRPr lang="en-US"/>
           </a:p>
@@ -792,7 +792,7 @@
           <a:p>
             <a:fld id="{B18F98B3-83FE-5043-B9A5-7A92B3418AA7}" type="datetimeFigureOut">
               <a:rPr lang="en-US" smtClean="0"/>
-              <a:t>7/24/17</a:t>
+              <a:t>7/25/17</a:t>
             </a:fld>
             <a:endParaRPr lang="en-US"/>
           </a:p>
@@ -968,7 +968,7 @@
           <a:p>
             <a:fld id="{B18F98B3-83FE-5043-B9A5-7A92B3418AA7}" type="datetimeFigureOut">
               <a:rPr lang="en-US" smtClean="0"/>
-              <a:t>7/24/17</a:t>
+              <a:t>7/25/17</a:t>
             </a:fld>
             <a:endParaRPr lang="en-US"/>
           </a:p>
@@ -1134,7 +1134,7 @@
           <a:p>
             <a:fld id="{B18F98B3-83FE-5043-B9A5-7A92B3418AA7}" type="datetimeFigureOut">
               <a:rPr lang="en-US" smtClean="0"/>
-              <a:t>7/24/17</a:t>
+              <a:t>7/25/17</a:t>
             </a:fld>
             <a:endParaRPr lang="en-US"/>
           </a:p>
@@ -1451,7 +1451,7 @@
           <a:p>
             <a:fld id="{B18F98B3-83FE-5043-B9A5-7A92B3418AA7}" type="datetimeFigureOut">
               <a:rPr lang="en-US" smtClean="0"/>
-              <a:t>7/24/17</a:t>
+              <a:t>7/25/17</a:t>
             </a:fld>
             <a:endParaRPr lang="en-US"/>
           </a:p>
@@ -1907,7 +1907,7 @@
           <a:p>
             <a:fld id="{B18F98B3-83FE-5043-B9A5-7A92B3418AA7}" type="datetimeFigureOut">
               <a:rPr lang="en-US" smtClean="0"/>
-              <a:t>7/24/17</a:t>
+              <a:t>7/25/17</a:t>
             </a:fld>
             <a:endParaRPr lang="en-US"/>
           </a:p>
@@ -2314,7 +2314,7 @@
           <a:p>
             <a:fld id="{B18F98B3-83FE-5043-B9A5-7A92B3418AA7}" type="datetimeFigureOut">
               <a:rPr lang="en-US" smtClean="0"/>
-              <a:t>7/24/17</a:t>
+              <a:t>7/25/17</a:t>
             </a:fld>
             <a:endParaRPr lang="en-US"/>
           </a:p>
@@ -2428,7 +2428,7 @@
           <a:p>
             <a:fld id="{B18F98B3-83FE-5043-B9A5-7A92B3418AA7}" type="datetimeFigureOut">
               <a:rPr lang="en-US" smtClean="0"/>
-              <a:t>7/24/17</a:t>
+              <a:t>7/25/17</a:t>
             </a:fld>
             <a:endParaRPr lang="en-US"/>
           </a:p>
@@ -2542,7 +2542,7 @@
           <a:p>
             <a:fld id="{B18F98B3-83FE-5043-B9A5-7A92B3418AA7}" type="datetimeFigureOut">
               <a:rPr lang="en-US" smtClean="0"/>
-              <a:t>7/24/17</a:t>
+              <a:t>7/25/17</a:t>
             </a:fld>
             <a:endParaRPr lang="en-US"/>
           </a:p>
@@ -2896,7 +2896,7 @@
           <a:p>
             <a:fld id="{B18F98B3-83FE-5043-B9A5-7A92B3418AA7}" type="datetimeFigureOut">
               <a:rPr lang="en-US" smtClean="0"/>
-              <a:t>7/24/17</a:t>
+              <a:t>7/25/17</a:t>
             </a:fld>
             <a:endParaRPr lang="en-US"/>
           </a:p>
@@ -3399,7 +3399,7 @@
           <a:p>
             <a:fld id="{B18F98B3-83FE-5043-B9A5-7A92B3418AA7}" type="datetimeFigureOut">
               <a:rPr lang="en-US" smtClean="0"/>
-              <a:t>7/24/17</a:t>
+              <a:t>7/25/17</a:t>
             </a:fld>
             <a:endParaRPr lang="en-US"/>
           </a:p>
@@ -3750,7 +3750,7 @@
           <a:p>
             <a:fld id="{B18F98B3-83FE-5043-B9A5-7A92B3418AA7}" type="datetimeFigureOut">
               <a:rPr lang="en-US" smtClean="0"/>
-              <a:t>7/24/17</a:t>
+              <a:t>7/25/17</a:t>
             </a:fld>
             <a:endParaRPr lang="en-US"/>
           </a:p>
@@ -5788,29 +5788,19 @@
           <a:lstStyle/>
           <a:p>
             <a:r>
+              <a:rPr lang="en-US" sz="2500" smtClean="0"/>
+              <a:t>Data mining</a:t>
+            </a:r>
+            <a:endParaRPr lang="en-US" sz="2500" dirty="0" smtClean="0"/>
+          </a:p>
+          <a:p>
+            <a:r>
               <a:rPr lang="en-US" sz="2500" dirty="0" smtClean="0"/>
-              <a:t>Search Engines</a:t>
-            </a:r>
-          </a:p>
-          <a:p>
-            <a:pPr lvl="1"/>
+              <a:t>Language </a:t>
+            </a:r>
             <a:r>
               <a:rPr lang="en-US" sz="2500" dirty="0" smtClean="0"/>
-              <a:t>Google </a:t>
-            </a:r>
-          </a:p>
-          <a:p>
-            <a:pPr lvl="1"/>
-            <a:r>
-              <a:rPr lang="en-US" sz="2500" dirty="0" smtClean="0"/>
-              <a:t>Yahoo</a:t>
-            </a:r>
-            <a:endParaRPr lang="en-US" sz="2500" dirty="0"/>
-          </a:p>
-          <a:p>
-            <a:r>
-              <a:rPr lang="en-US" sz="2500" dirty="0" smtClean="0"/>
-              <a:t>Language Translation</a:t>
+              <a:t>Translation</a:t>
             </a:r>
           </a:p>
           <a:p>
@@ -6083,7 +6073,7 @@
   <a:extraClrSchemeLst/>
   <a:extLst>
     <a:ext uri="{05A4C25C-085E-4340-85A3-A5531E510DB2}">
-      <thm15:themeFamily xmlns="" xmlns:thm15="http://schemas.microsoft.com/office/thememl/2012/main" name="Wood Type" id="{7ACABC62-BF99-48CF-A9DC-4DB89C7B13DC}" vid="{142A1326-48AB-42A9-8428-CB14AA30176D}"/>
+      <thm15:themeFamily xmlns:thm15="http://schemas.microsoft.com/office/thememl/2012/main" xmlns="" name="Wood Type" id="{7ACABC62-BF99-48CF-A9DC-4DB89C7B13DC}" vid="{142A1326-48AB-42A9-8428-CB14AA30176D}"/>
     </a:ext>
   </a:extLst>
 </a:theme>

</xml_diff>